<commit_message>
Base for Checkpoint 3 & 4
</commit_message>
<xml_diff>
--- a/Daily_Lectures/Day01/INFO3111S23_W01_Course_Intro (long and boring PPT).pptx
+++ b/Daily_Lectures/Day01/INFO3111S23_W01_Course_Intro (long and boring PPT).pptx
@@ -5,7 +5,7 @@
     <p:sldMasterId id="2147483648" r:id="rId1"/>
   </p:sldMasterIdLst>
   <p:notesMasterIdLst>
-    <p:notesMasterId r:id="rId51"/>
+    <p:notesMasterId r:id="rId50"/>
   </p:notesMasterIdLst>
   <p:sldIdLst>
     <p:sldId id="305" r:id="rId2"/>
@@ -50,13 +50,12 @@
     <p:sldId id="283" r:id="rId41"/>
     <p:sldId id="277" r:id="rId42"/>
     <p:sldId id="271" r:id="rId43"/>
-    <p:sldId id="304" r:id="rId44"/>
-    <p:sldId id="326" r:id="rId45"/>
-    <p:sldId id="327" r:id="rId46"/>
-    <p:sldId id="322" r:id="rId47"/>
-    <p:sldId id="323" r:id="rId48"/>
-    <p:sldId id="324" r:id="rId49"/>
-    <p:sldId id="325" r:id="rId50"/>
+    <p:sldId id="326" r:id="rId44"/>
+    <p:sldId id="327" r:id="rId45"/>
+    <p:sldId id="322" r:id="rId46"/>
+    <p:sldId id="323" r:id="rId47"/>
+    <p:sldId id="324" r:id="rId48"/>
+    <p:sldId id="325" r:id="rId49"/>
   </p:sldIdLst>
   <p:sldSz cx="9144000" cy="5143500" type="screen16x9"/>
   <p:notesSz cx="6858000" cy="9144000"/>
@@ -358,7 +357,7 @@
               <a:pPr>
                 <a:defRPr/>
               </a:pPr>
-              <a:t>5/4/2023</a:t>
+              <a:t>5/5/2023</a:t>
             </a:fld>
             <a:endParaRPr lang="en-US"/>
           </a:p>
@@ -1492,7 +1491,7 @@
               <a:pPr>
                 <a:defRPr/>
               </a:pPr>
-              <a:t>5/4/2023</a:t>
+              <a:t>5/5/2023</a:t>
             </a:fld>
             <a:endParaRPr lang="en-US"/>
           </a:p>
@@ -1616,7 +1615,7 @@
               <a:pPr>
                 <a:defRPr/>
               </a:pPr>
-              <a:t>5/4/2023</a:t>
+              <a:t>5/5/2023</a:t>
             </a:fld>
             <a:endParaRPr lang="en-US" dirty="0"/>
           </a:p>
@@ -1806,7 +1805,7 @@
               <a:pPr>
                 <a:defRPr/>
               </a:pPr>
-              <a:t>5/4/2023</a:t>
+              <a:t>5/5/2023</a:t>
             </a:fld>
             <a:endParaRPr lang="en-US" dirty="0"/>
           </a:p>
@@ -2060,7 +2059,7 @@
               <a:pPr>
                 <a:defRPr/>
               </a:pPr>
-              <a:t>5/4/2023</a:t>
+              <a:t>5/5/2023</a:t>
             </a:fld>
             <a:endParaRPr lang="en-US"/>
           </a:p>
@@ -2366,7 +2365,7 @@
               <a:pPr>
                 <a:defRPr/>
               </a:pPr>
-              <a:t>5/4/2023</a:t>
+              <a:t>5/5/2023</a:t>
             </a:fld>
             <a:endParaRPr lang="en-US"/>
           </a:p>
@@ -3321,7 +3320,7 @@
               <a:pPr>
                 <a:defRPr/>
               </a:pPr>
-              <a:t>5/4/2023</a:t>
+              <a:t>5/5/2023</a:t>
             </a:fld>
             <a:endParaRPr lang="en-US"/>
           </a:p>
@@ -3473,7 +3472,7 @@
               <a:pPr>
                 <a:defRPr/>
               </a:pPr>
-              <a:t>5/4/2023</a:t>
+              <a:t>5/5/2023</a:t>
             </a:fld>
             <a:endParaRPr lang="en-US" dirty="0"/>
           </a:p>
@@ -3591,7 +3590,7 @@
               <a:pPr>
                 <a:defRPr/>
               </a:pPr>
-              <a:t>5/4/2023</a:t>
+              <a:t>5/5/2023</a:t>
             </a:fld>
             <a:endParaRPr lang="en-US"/>
           </a:p>
@@ -3869,7 +3868,7 @@
               <a:pPr>
                 <a:defRPr/>
               </a:pPr>
-              <a:t>5/4/2023</a:t>
+              <a:t>5/5/2023</a:t>
             </a:fld>
             <a:endParaRPr lang="en-US"/>
           </a:p>
@@ -4620,7 +4619,7 @@
               <a:pPr>
                 <a:defRPr/>
               </a:pPr>
-              <a:t>5/4/2023</a:t>
+              <a:t>5/5/2023</a:t>
             </a:fld>
             <a:endParaRPr lang="en-US"/>
           </a:p>
@@ -4870,7 +4869,7 @@
               <a:pPr>
                 <a:defRPr/>
               </a:pPr>
-              <a:t>5/4/2023</a:t>
+              <a:t>5/5/2023</a:t>
             </a:fld>
             <a:endParaRPr lang="en-US" dirty="0"/>
           </a:p>
@@ -30198,6 +30197,144 @@
       </p:grpSpPr>
       <p:sp>
         <p:nvSpPr>
+          <p:cNvPr id="12" name="Rectangle: Rounded Corners 11">
+            <a:extLst>
+              <a:ext uri="{FF2B5EF4-FFF2-40B4-BE49-F238E27FC236}">
+                <a16:creationId xmlns:a16="http://schemas.microsoft.com/office/drawing/2014/main" id="{57843099-2A49-8E42-656A-8BB40E6560AD}"/>
+              </a:ext>
+            </a:extLst>
+          </p:cNvPr>
+          <p:cNvSpPr/>
+          <p:nvPr/>
+        </p:nvSpPr>
+        <p:spPr>
+          <a:xfrm>
+            <a:off x="4788024" y="483518"/>
+            <a:ext cx="2952328" cy="3202923"/>
+          </a:xfrm>
+          <a:prstGeom prst="roundRect">
+            <a:avLst/>
+          </a:prstGeom>
+        </p:spPr>
+        <p:style>
+          <a:lnRef idx="3">
+            <a:schemeClr val="lt1"/>
+          </a:lnRef>
+          <a:fillRef idx="1">
+            <a:schemeClr val="accent4"/>
+          </a:fillRef>
+          <a:effectRef idx="1">
+            <a:schemeClr val="accent4"/>
+          </a:effectRef>
+          <a:fontRef idx="minor">
+            <a:schemeClr val="lt1"/>
+          </a:fontRef>
+        </p:style>
+        <p:txBody>
+          <a:bodyPr rtlCol="0" anchor="ctr"/>
+          <a:lstStyle/>
+          <a:p>
+            <a:pPr algn="ctr"/>
+            <a:endParaRPr lang="en-CA"/>
+          </a:p>
+        </p:txBody>
+      </p:sp>
+      <p:sp>
+        <p:nvSpPr>
+          <p:cNvPr id="11" name="Rectangle: Rounded Corners 10">
+            <a:extLst>
+              <a:ext uri="{FF2B5EF4-FFF2-40B4-BE49-F238E27FC236}">
+                <a16:creationId xmlns:a16="http://schemas.microsoft.com/office/drawing/2014/main" id="{0E24D24D-68DF-90FB-ED49-ECB84C4810FD}"/>
+              </a:ext>
+            </a:extLst>
+          </p:cNvPr>
+          <p:cNvSpPr/>
+          <p:nvPr/>
+        </p:nvSpPr>
+        <p:spPr>
+          <a:xfrm>
+            <a:off x="755576" y="339502"/>
+            <a:ext cx="2437310" cy="4680520"/>
+          </a:xfrm>
+          <a:prstGeom prst="roundRect">
+            <a:avLst/>
+          </a:prstGeom>
+        </p:spPr>
+        <p:style>
+          <a:lnRef idx="3">
+            <a:schemeClr val="lt1"/>
+          </a:lnRef>
+          <a:fillRef idx="1">
+            <a:schemeClr val="accent4"/>
+          </a:fillRef>
+          <a:effectRef idx="1">
+            <a:schemeClr val="accent4"/>
+          </a:effectRef>
+          <a:fontRef idx="minor">
+            <a:schemeClr val="lt1"/>
+          </a:fontRef>
+        </p:style>
+        <p:txBody>
+          <a:bodyPr rtlCol="0" anchor="ctr"/>
+          <a:lstStyle/>
+          <a:p>
+            <a:pPr algn="ctr"/>
+            <a:endParaRPr lang="en-CA"/>
+          </a:p>
+        </p:txBody>
+      </p:sp>
+      <p:sp>
+        <p:nvSpPr>
+          <p:cNvPr id="9" name="Rectangle: Rounded Corners 8">
+            <a:extLst>
+              <a:ext uri="{FF2B5EF4-FFF2-40B4-BE49-F238E27FC236}">
+                <a16:creationId xmlns:a16="http://schemas.microsoft.com/office/drawing/2014/main" id="{A3CB8FE8-E4B1-3417-96BC-59508106B601}"/>
+              </a:ext>
+            </a:extLst>
+          </p:cNvPr>
+          <p:cNvSpPr/>
+          <p:nvPr/>
+        </p:nvSpPr>
+        <p:spPr>
+          <a:xfrm>
+            <a:off x="5340101" y="2313806"/>
+            <a:ext cx="1867718" cy="720080"/>
+          </a:xfrm>
+          <a:prstGeom prst="roundRect">
+            <a:avLst/>
+          </a:prstGeom>
+        </p:spPr>
+        <p:style>
+          <a:lnRef idx="2">
+            <a:schemeClr val="accent1">
+              <a:shade val="50000"/>
+            </a:schemeClr>
+          </a:lnRef>
+          <a:fillRef idx="1">
+            <a:schemeClr val="accent1"/>
+          </a:fillRef>
+          <a:effectRef idx="0">
+            <a:schemeClr val="accent1"/>
+          </a:effectRef>
+          <a:fontRef idx="minor">
+            <a:schemeClr val="lt1"/>
+          </a:fontRef>
+        </p:style>
+        <p:txBody>
+          <a:bodyPr rtlCol="0" anchor="ctr"/>
+          <a:lstStyle/>
+          <a:p>
+            <a:pPr algn="ctr"/>
+            <a:r>
+              <a:rPr lang="en-US" dirty="0"/>
+              <a:t>RAM 8G</a:t>
+            </a:r>
+            <a:endParaRPr lang="en-CA" dirty="0"/>
+          </a:p>
+        </p:txBody>
+      </p:sp>
+      <p:sp>
+        <p:nvSpPr>
           <p:cNvPr id="2" name="Rectangle: Rounded Corners 1">
             <a:extLst>
               <a:ext uri="{FF2B5EF4-FFF2-40B4-BE49-F238E27FC236}">
@@ -30210,7 +30347,7 @@
         </p:nvSpPr>
         <p:spPr>
           <a:xfrm>
-            <a:off x="467544" y="843558"/>
+            <a:off x="1115616" y="843558"/>
             <a:ext cx="1656184" cy="720080"/>
           </a:xfrm>
           <a:prstGeom prst="roundRect">
@@ -30260,8 +30397,8 @@
         </p:nvSpPr>
         <p:spPr>
           <a:xfrm>
-            <a:off x="353815" y="2313806"/>
-            <a:ext cx="1867718" cy="720080"/>
+            <a:off x="1001887" y="2313806"/>
+            <a:ext cx="2057945" cy="720080"/>
           </a:xfrm>
           <a:prstGeom prst="roundRect">
             <a:avLst/>
@@ -30310,7 +30447,7 @@
         </p:nvSpPr>
         <p:spPr>
           <a:xfrm>
-            <a:off x="971600" y="1563638"/>
+            <a:off x="1619672" y="1563638"/>
             <a:ext cx="648072" cy="720080"/>
           </a:xfrm>
           <a:prstGeom prst="upDownArrow">
@@ -30359,7 +30496,7 @@
         </p:nvSpPr>
         <p:spPr>
           <a:xfrm>
-            <a:off x="466230" y="3969990"/>
+            <a:off x="1146139" y="3939902"/>
             <a:ext cx="1656184" cy="720080"/>
           </a:xfrm>
           <a:prstGeom prst="roundRect">
@@ -30409,7 +30546,7 @@
         </p:nvSpPr>
         <p:spPr>
           <a:xfrm>
-            <a:off x="963638" y="3033886"/>
+            <a:off x="1611710" y="3033886"/>
             <a:ext cx="648072" cy="906016"/>
           </a:xfrm>
           <a:prstGeom prst="upDownArrow">
@@ -30441,60 +30578,10 @@
           <a:p>
             <a:pPr algn="ctr"/>
             <a:r>
-              <a:rPr lang="en-US" dirty="0"/>
+              <a:rPr lang="en-US" sz="1050" dirty="0"/>
               <a:t>CODE</a:t>
             </a:r>
             <a:endParaRPr lang="en-CA" dirty="0"/>
-          </a:p>
-        </p:txBody>
-      </p:sp>
-      <p:sp>
-        <p:nvSpPr>
-          <p:cNvPr id="7" name="Rectangle: Rounded Corners 6">
-            <a:extLst>
-              <a:ext uri="{FF2B5EF4-FFF2-40B4-BE49-F238E27FC236}">
-                <a16:creationId xmlns:a16="http://schemas.microsoft.com/office/drawing/2014/main" id="{B924CF71-37E5-7DA2-B6BB-FA5A62A53D11}"/>
-              </a:ext>
-            </a:extLst>
-          </p:cNvPr>
-          <p:cNvSpPr/>
-          <p:nvPr/>
-        </p:nvSpPr>
-        <p:spPr>
-          <a:xfrm>
-            <a:off x="1907704" y="918456"/>
-            <a:ext cx="1008112" cy="323366"/>
-          </a:xfrm>
-          <a:prstGeom prst="roundRect">
-            <a:avLst/>
-          </a:prstGeom>
-        </p:spPr>
-        <p:style>
-          <a:lnRef idx="2">
-            <a:schemeClr val="accent1">
-              <a:shade val="50000"/>
-            </a:schemeClr>
-          </a:lnRef>
-          <a:fillRef idx="1">
-            <a:schemeClr val="accent1"/>
-          </a:fillRef>
-          <a:effectRef idx="0">
-            <a:schemeClr val="accent1"/>
-          </a:effectRef>
-          <a:fontRef idx="minor">
-            <a:schemeClr val="lt1"/>
-          </a:fontRef>
-        </p:style>
-        <p:txBody>
-          <a:bodyPr rtlCol="0" anchor="ctr"/>
-          <a:lstStyle/>
-          <a:p>
-            <a:pPr algn="ctr"/>
-            <a:r>
-              <a:rPr lang="en-US" sz="1400" dirty="0"/>
-              <a:t>32-1000</a:t>
-            </a:r>
-            <a:endParaRPr lang="en-CA" sz="1400" dirty="0"/>
           </a:p>
         </p:txBody>
       </p:sp>
@@ -30512,7 +30599,7 @@
         </p:nvSpPr>
         <p:spPr>
           <a:xfrm>
-            <a:off x="4344268" y="903412"/>
+            <a:off x="4992340" y="903412"/>
             <a:ext cx="2437310" cy="720080"/>
           </a:xfrm>
           <a:prstGeom prst="roundRect">
@@ -30550,56 +30637,6 @@
       </p:sp>
       <p:sp>
         <p:nvSpPr>
-          <p:cNvPr id="9" name="Rectangle: Rounded Corners 8">
-            <a:extLst>
-              <a:ext uri="{FF2B5EF4-FFF2-40B4-BE49-F238E27FC236}">
-                <a16:creationId xmlns:a16="http://schemas.microsoft.com/office/drawing/2014/main" id="{A3CB8FE8-E4B1-3417-96BC-59508106B601}"/>
-              </a:ext>
-            </a:extLst>
-          </p:cNvPr>
-          <p:cNvSpPr/>
-          <p:nvPr/>
-        </p:nvSpPr>
-        <p:spPr>
-          <a:xfrm>
-            <a:off x="4692029" y="2313806"/>
-            <a:ext cx="1867718" cy="720080"/>
-          </a:xfrm>
-          <a:prstGeom prst="roundRect">
-            <a:avLst/>
-          </a:prstGeom>
-        </p:spPr>
-        <p:style>
-          <a:lnRef idx="2">
-            <a:schemeClr val="accent1">
-              <a:shade val="50000"/>
-            </a:schemeClr>
-          </a:lnRef>
-          <a:fillRef idx="1">
-            <a:schemeClr val="accent1"/>
-          </a:fillRef>
-          <a:effectRef idx="0">
-            <a:schemeClr val="accent1"/>
-          </a:effectRef>
-          <a:fontRef idx="minor">
-            <a:schemeClr val="lt1"/>
-          </a:fontRef>
-        </p:style>
-        <p:txBody>
-          <a:bodyPr rtlCol="0" anchor="ctr"/>
-          <a:lstStyle/>
-          <a:p>
-            <a:pPr algn="ctr"/>
-            <a:r>
-              <a:rPr lang="en-US" dirty="0"/>
-              <a:t>RAM 8G</a:t>
-            </a:r>
-            <a:endParaRPr lang="en-CA" dirty="0"/>
-          </a:p>
-        </p:txBody>
-      </p:sp>
-      <p:sp>
-        <p:nvSpPr>
           <p:cNvPr id="10" name="Arrow: Up-Down 9">
             <a:extLst>
               <a:ext uri="{FF2B5EF4-FFF2-40B4-BE49-F238E27FC236}">
@@ -30612,7 +30649,7 @@
         </p:nvSpPr>
         <p:spPr>
           <a:xfrm>
-            <a:off x="5292080" y="1638536"/>
+            <a:off x="5940152" y="1638536"/>
             <a:ext cx="648072" cy="720080"/>
           </a:xfrm>
           <a:prstGeom prst="upDownArrow">
@@ -30644,60 +30681,10 @@
           <a:p>
             <a:pPr algn="ctr"/>
             <a:r>
-              <a:rPr lang="en-US" dirty="0"/>
+              <a:rPr lang="en-US" sz="1050" dirty="0"/>
               <a:t>Code</a:t>
             </a:r>
             <a:endParaRPr lang="en-CA" dirty="0"/>
-          </a:p>
-        </p:txBody>
-      </p:sp>
-      <p:sp>
-        <p:nvSpPr>
-          <p:cNvPr id="13" name="Rectangle: Rounded Corners 12">
-            <a:extLst>
-              <a:ext uri="{FF2B5EF4-FFF2-40B4-BE49-F238E27FC236}">
-                <a16:creationId xmlns:a16="http://schemas.microsoft.com/office/drawing/2014/main" id="{6435AFC8-6E94-B69B-F8FE-CAF13DC60998}"/>
-              </a:ext>
-            </a:extLst>
-          </p:cNvPr>
-          <p:cNvSpPr/>
-          <p:nvPr/>
-        </p:nvSpPr>
-        <p:spPr>
-          <a:xfrm>
-            <a:off x="6732240" y="918456"/>
-            <a:ext cx="1440160" cy="390128"/>
-          </a:xfrm>
-          <a:prstGeom prst="roundRect">
-            <a:avLst/>
-          </a:prstGeom>
-        </p:spPr>
-        <p:style>
-          <a:lnRef idx="2">
-            <a:schemeClr val="accent1">
-              <a:shade val="50000"/>
-            </a:schemeClr>
-          </a:lnRef>
-          <a:fillRef idx="1">
-            <a:schemeClr val="accent1"/>
-          </a:fillRef>
-          <a:effectRef idx="0">
-            <a:schemeClr val="accent1"/>
-          </a:effectRef>
-          <a:fontRef idx="minor">
-            <a:schemeClr val="lt1"/>
-          </a:fontRef>
-        </p:style>
-        <p:txBody>
-          <a:bodyPr rtlCol="0" anchor="ctr"/>
-          <a:lstStyle/>
-          <a:p>
-            <a:pPr algn="ctr"/>
-            <a:r>
-              <a:rPr lang="en-US" sz="1400" dirty="0"/>
-              <a:t>65,000 REG</a:t>
-            </a:r>
-            <a:endParaRPr lang="en-CA" sz="1400" dirty="0"/>
           </a:p>
         </p:txBody>
       </p:sp>
@@ -30715,590 +30702,7 @@
         </p:nvSpPr>
         <p:spPr>
           <a:xfrm rot="16200000">
-            <a:off x="3132745" y="1491195"/>
-            <a:ext cx="648072" cy="2437309"/>
-          </a:xfrm>
-          <a:prstGeom prst="upDownArrow">
-            <a:avLst>
-              <a:gd name="adj1" fmla="val 50000"/>
-              <a:gd name="adj2" fmla="val 26484"/>
-            </a:avLst>
-          </a:prstGeom>
-        </p:spPr>
-        <p:style>
-          <a:lnRef idx="2">
-            <a:schemeClr val="accent1">
-              <a:shade val="50000"/>
-            </a:schemeClr>
-          </a:lnRef>
-          <a:fillRef idx="1">
-            <a:schemeClr val="accent1"/>
-          </a:fillRef>
-          <a:effectRef idx="0">
-            <a:schemeClr val="accent1"/>
-          </a:effectRef>
-          <a:fontRef idx="minor">
-            <a:schemeClr val="lt1"/>
-          </a:fontRef>
-        </p:style>
-        <p:txBody>
-          <a:bodyPr rtlCol="0" anchor="ctr"/>
-          <a:lstStyle/>
-          <a:p>
-            <a:pPr algn="ctr"/>
-            <a:r>
-              <a:rPr lang="en-US" dirty="0"/>
-              <a:t>CODE</a:t>
-            </a:r>
-            <a:endParaRPr lang="en-CA" dirty="0"/>
-          </a:p>
-        </p:txBody>
-      </p:sp>
-    </p:spTree>
-  </p:cSld>
-  <p:clrMapOvr>
-    <a:masterClrMapping/>
-  </p:clrMapOvr>
-</p:sld>
-</file>
-
-<file path=ppt/slides/slide44.xml><?xml version="1.0" encoding="utf-8"?>
-<p:sld xmlns:a="http://schemas.openxmlformats.org/drawingml/2006/main" xmlns:r="http://schemas.openxmlformats.org/officeDocument/2006/relationships" xmlns:p="http://schemas.openxmlformats.org/presentationml/2006/main">
-  <p:cSld>
-    <p:spTree>
-      <p:nvGrpSpPr>
-        <p:cNvPr id="1" name=""/>
-        <p:cNvGrpSpPr/>
-        <p:nvPr/>
-      </p:nvGrpSpPr>
-      <p:grpSpPr>
-        <a:xfrm>
-          <a:off x="0" y="0"/>
-          <a:ext cx="0" cy="0"/>
-          <a:chOff x="0" y="0"/>
-          <a:chExt cx="0" cy="0"/>
-        </a:xfrm>
-      </p:grpSpPr>
-      <p:sp>
-        <p:nvSpPr>
-          <p:cNvPr id="9" name="Rectangle: Rounded Corners 8">
-            <a:extLst>
-              <a:ext uri="{FF2B5EF4-FFF2-40B4-BE49-F238E27FC236}">
-                <a16:creationId xmlns:a16="http://schemas.microsoft.com/office/drawing/2014/main" id="{A3CB8FE8-E4B1-3417-96BC-59508106B601}"/>
-              </a:ext>
-            </a:extLst>
-          </p:cNvPr>
-          <p:cNvSpPr/>
-          <p:nvPr/>
-        </p:nvSpPr>
-        <p:spPr>
-          <a:xfrm>
-            <a:off x="4692029" y="2313806"/>
-            <a:ext cx="1867718" cy="720080"/>
-          </a:xfrm>
-          <a:prstGeom prst="roundRect">
-            <a:avLst/>
-          </a:prstGeom>
-        </p:spPr>
-        <p:style>
-          <a:lnRef idx="2">
-            <a:schemeClr val="accent1">
-              <a:shade val="50000"/>
-            </a:schemeClr>
-          </a:lnRef>
-          <a:fillRef idx="1">
-            <a:schemeClr val="accent1"/>
-          </a:fillRef>
-          <a:effectRef idx="0">
-            <a:schemeClr val="accent1"/>
-          </a:effectRef>
-          <a:fontRef idx="minor">
-            <a:schemeClr val="lt1"/>
-          </a:fontRef>
-        </p:style>
-        <p:txBody>
-          <a:bodyPr rtlCol="0" anchor="ctr"/>
-          <a:lstStyle/>
-          <a:p>
-            <a:pPr algn="ctr"/>
-            <a:r>
-              <a:rPr lang="en-US" dirty="0"/>
-              <a:t>RAM 8G</a:t>
-            </a:r>
-            <a:endParaRPr lang="en-CA" dirty="0"/>
-          </a:p>
-        </p:txBody>
-      </p:sp>
-      <p:sp>
-        <p:nvSpPr>
-          <p:cNvPr id="2" name="Rectangle: Rounded Corners 1">
-            <a:extLst>
-              <a:ext uri="{FF2B5EF4-FFF2-40B4-BE49-F238E27FC236}">
-                <a16:creationId xmlns:a16="http://schemas.microsoft.com/office/drawing/2014/main" id="{8AF543E8-848A-48B7-C86B-CABBF770EC40}"/>
-              </a:ext>
-            </a:extLst>
-          </p:cNvPr>
-          <p:cNvSpPr/>
-          <p:nvPr/>
-        </p:nvSpPr>
-        <p:spPr>
-          <a:xfrm>
-            <a:off x="467544" y="843558"/>
-            <a:ext cx="1656184" cy="720080"/>
-          </a:xfrm>
-          <a:prstGeom prst="roundRect">
-            <a:avLst/>
-          </a:prstGeom>
-        </p:spPr>
-        <p:style>
-          <a:lnRef idx="2">
-            <a:schemeClr val="accent1">
-              <a:shade val="50000"/>
-            </a:schemeClr>
-          </a:lnRef>
-          <a:fillRef idx="1">
-            <a:schemeClr val="accent1"/>
-          </a:fillRef>
-          <a:effectRef idx="0">
-            <a:schemeClr val="accent1"/>
-          </a:effectRef>
-          <a:fontRef idx="minor">
-            <a:schemeClr val="lt1"/>
-          </a:fontRef>
-        </p:style>
-        <p:txBody>
-          <a:bodyPr rtlCol="0" anchor="ctr"/>
-          <a:lstStyle/>
-          <a:p>
-            <a:pPr algn="ctr"/>
-            <a:r>
-              <a:rPr lang="en-US" dirty="0"/>
-              <a:t>CPU 4.0Gx16</a:t>
-            </a:r>
-            <a:endParaRPr lang="en-CA" dirty="0"/>
-          </a:p>
-        </p:txBody>
-      </p:sp>
-      <p:sp>
-        <p:nvSpPr>
-          <p:cNvPr id="3" name="Rectangle: Rounded Corners 2">
-            <a:extLst>
-              <a:ext uri="{FF2B5EF4-FFF2-40B4-BE49-F238E27FC236}">
-                <a16:creationId xmlns:a16="http://schemas.microsoft.com/office/drawing/2014/main" id="{4F737B90-70DF-0196-B3CA-CE42E35438A8}"/>
-              </a:ext>
-            </a:extLst>
-          </p:cNvPr>
-          <p:cNvSpPr/>
-          <p:nvPr/>
-        </p:nvSpPr>
-        <p:spPr>
-          <a:xfrm>
-            <a:off x="353815" y="2313806"/>
-            <a:ext cx="2057945" cy="720080"/>
-          </a:xfrm>
-          <a:prstGeom prst="roundRect">
-            <a:avLst/>
-          </a:prstGeom>
-        </p:spPr>
-        <p:style>
-          <a:lnRef idx="2">
-            <a:schemeClr val="accent1">
-              <a:shade val="50000"/>
-            </a:schemeClr>
-          </a:lnRef>
-          <a:fillRef idx="1">
-            <a:schemeClr val="accent1"/>
-          </a:fillRef>
-          <a:effectRef idx="0">
-            <a:schemeClr val="accent1"/>
-          </a:effectRef>
-          <a:fontRef idx="minor">
-            <a:schemeClr val="lt1"/>
-          </a:fontRef>
-        </p:style>
-        <p:txBody>
-          <a:bodyPr rtlCol="0" anchor="ctr"/>
-          <a:lstStyle/>
-          <a:p>
-            <a:pPr algn="ctr"/>
-            <a:r>
-              <a:rPr lang="en-US" dirty="0"/>
-              <a:t>RAM 32G</a:t>
-            </a:r>
-            <a:endParaRPr lang="en-CA" dirty="0"/>
-          </a:p>
-        </p:txBody>
-      </p:sp>
-      <p:sp>
-        <p:nvSpPr>
-          <p:cNvPr id="4" name="Arrow: Up-Down 3">
-            <a:extLst>
-              <a:ext uri="{FF2B5EF4-FFF2-40B4-BE49-F238E27FC236}">
-                <a16:creationId xmlns:a16="http://schemas.microsoft.com/office/drawing/2014/main" id="{FF4184F7-A774-D251-3547-E9CBD09893EE}"/>
-              </a:ext>
-            </a:extLst>
-          </p:cNvPr>
-          <p:cNvSpPr/>
-          <p:nvPr/>
-        </p:nvSpPr>
-        <p:spPr>
-          <a:xfrm>
-            <a:off x="971600" y="1563638"/>
-            <a:ext cx="648072" cy="720080"/>
-          </a:xfrm>
-          <a:prstGeom prst="upDownArrow">
-            <a:avLst>
-              <a:gd name="adj1" fmla="val 50000"/>
-              <a:gd name="adj2" fmla="val 26484"/>
-            </a:avLst>
-          </a:prstGeom>
-        </p:spPr>
-        <p:style>
-          <a:lnRef idx="2">
-            <a:schemeClr val="accent1">
-              <a:shade val="50000"/>
-            </a:schemeClr>
-          </a:lnRef>
-          <a:fillRef idx="1">
-            <a:schemeClr val="accent1"/>
-          </a:fillRef>
-          <a:effectRef idx="0">
-            <a:schemeClr val="accent1"/>
-          </a:effectRef>
-          <a:fontRef idx="minor">
-            <a:schemeClr val="lt1"/>
-          </a:fontRef>
-        </p:style>
-        <p:txBody>
-          <a:bodyPr rtlCol="0" anchor="ctr"/>
-          <a:lstStyle/>
-          <a:p>
-            <a:pPr algn="ctr"/>
-            <a:endParaRPr lang="en-CA"/>
-          </a:p>
-        </p:txBody>
-      </p:sp>
-      <p:sp>
-        <p:nvSpPr>
-          <p:cNvPr id="5" name="Rectangle: Rounded Corners 4">
-            <a:extLst>
-              <a:ext uri="{FF2B5EF4-FFF2-40B4-BE49-F238E27FC236}">
-                <a16:creationId xmlns:a16="http://schemas.microsoft.com/office/drawing/2014/main" id="{43E90C28-1CE6-C07F-0AF2-DC52F4CA3FC2}"/>
-              </a:ext>
-            </a:extLst>
-          </p:cNvPr>
-          <p:cNvSpPr/>
-          <p:nvPr/>
-        </p:nvSpPr>
-        <p:spPr>
-          <a:xfrm>
-            <a:off x="466230" y="3969990"/>
-            <a:ext cx="1656184" cy="720080"/>
-          </a:xfrm>
-          <a:prstGeom prst="roundRect">
-            <a:avLst/>
-          </a:prstGeom>
-        </p:spPr>
-        <p:style>
-          <a:lnRef idx="2">
-            <a:schemeClr val="accent1">
-              <a:shade val="50000"/>
-            </a:schemeClr>
-          </a:lnRef>
-          <a:fillRef idx="1">
-            <a:schemeClr val="accent1"/>
-          </a:fillRef>
-          <a:effectRef idx="0">
-            <a:schemeClr val="accent1"/>
-          </a:effectRef>
-          <a:fontRef idx="minor">
-            <a:schemeClr val="lt1"/>
-          </a:fontRef>
-        </p:style>
-        <p:txBody>
-          <a:bodyPr rtlCol="0" anchor="ctr"/>
-          <a:lstStyle/>
-          <a:p>
-            <a:pPr algn="ctr"/>
-            <a:r>
-              <a:rPr lang="en-US" dirty="0"/>
-              <a:t>HDD</a:t>
-            </a:r>
-            <a:endParaRPr lang="en-CA" dirty="0"/>
-          </a:p>
-        </p:txBody>
-      </p:sp>
-      <p:sp>
-        <p:nvSpPr>
-          <p:cNvPr id="6" name="Arrow: Up-Down 5">
-            <a:extLst>
-              <a:ext uri="{FF2B5EF4-FFF2-40B4-BE49-F238E27FC236}">
-                <a16:creationId xmlns:a16="http://schemas.microsoft.com/office/drawing/2014/main" id="{E716ED85-3AE2-2E40-993D-E001CB87D92E}"/>
-              </a:ext>
-            </a:extLst>
-          </p:cNvPr>
-          <p:cNvSpPr/>
-          <p:nvPr/>
-        </p:nvSpPr>
-        <p:spPr>
-          <a:xfrm>
-            <a:off x="963638" y="3033886"/>
-            <a:ext cx="648072" cy="906016"/>
-          </a:xfrm>
-          <a:prstGeom prst="upDownArrow">
-            <a:avLst>
-              <a:gd name="adj1" fmla="val 50000"/>
-              <a:gd name="adj2" fmla="val 26484"/>
-            </a:avLst>
-          </a:prstGeom>
-        </p:spPr>
-        <p:style>
-          <a:lnRef idx="2">
-            <a:schemeClr val="accent1">
-              <a:shade val="50000"/>
-            </a:schemeClr>
-          </a:lnRef>
-          <a:fillRef idx="1">
-            <a:schemeClr val="accent1"/>
-          </a:fillRef>
-          <a:effectRef idx="0">
-            <a:schemeClr val="accent1"/>
-          </a:effectRef>
-          <a:fontRef idx="minor">
-            <a:schemeClr val="lt1"/>
-          </a:fontRef>
-        </p:style>
-        <p:txBody>
-          <a:bodyPr rtlCol="0" anchor="ctr"/>
-          <a:lstStyle/>
-          <a:p>
-            <a:pPr algn="ctr"/>
-            <a:r>
-              <a:rPr lang="en-US" sz="1050" dirty="0"/>
-              <a:t>CODE</a:t>
-            </a:r>
-            <a:endParaRPr lang="en-CA" dirty="0"/>
-          </a:p>
-        </p:txBody>
-      </p:sp>
-      <p:sp>
-        <p:nvSpPr>
-          <p:cNvPr id="7" name="Rectangle: Rounded Corners 6">
-            <a:extLst>
-              <a:ext uri="{FF2B5EF4-FFF2-40B4-BE49-F238E27FC236}">
-                <a16:creationId xmlns:a16="http://schemas.microsoft.com/office/drawing/2014/main" id="{B924CF71-37E5-7DA2-B6BB-FA5A62A53D11}"/>
-              </a:ext>
-            </a:extLst>
-          </p:cNvPr>
-          <p:cNvSpPr/>
-          <p:nvPr/>
-        </p:nvSpPr>
-        <p:spPr>
-          <a:xfrm>
-            <a:off x="1907704" y="918456"/>
-            <a:ext cx="1008112" cy="323366"/>
-          </a:xfrm>
-          <a:prstGeom prst="roundRect">
-            <a:avLst/>
-          </a:prstGeom>
-        </p:spPr>
-        <p:style>
-          <a:lnRef idx="2">
-            <a:schemeClr val="accent1">
-              <a:shade val="50000"/>
-            </a:schemeClr>
-          </a:lnRef>
-          <a:fillRef idx="1">
-            <a:schemeClr val="accent1"/>
-          </a:fillRef>
-          <a:effectRef idx="0">
-            <a:schemeClr val="accent1"/>
-          </a:effectRef>
-          <a:fontRef idx="minor">
-            <a:schemeClr val="lt1"/>
-          </a:fontRef>
-        </p:style>
-        <p:txBody>
-          <a:bodyPr rtlCol="0" anchor="ctr"/>
-          <a:lstStyle/>
-          <a:p>
-            <a:pPr algn="ctr"/>
-            <a:r>
-              <a:rPr lang="en-US" sz="1400" dirty="0"/>
-              <a:t>32-1000</a:t>
-            </a:r>
-            <a:endParaRPr lang="en-CA" sz="1400" dirty="0"/>
-          </a:p>
-        </p:txBody>
-      </p:sp>
-      <p:sp>
-        <p:nvSpPr>
-          <p:cNvPr id="8" name="Rectangle: Rounded Corners 7">
-            <a:extLst>
-              <a:ext uri="{FF2B5EF4-FFF2-40B4-BE49-F238E27FC236}">
-                <a16:creationId xmlns:a16="http://schemas.microsoft.com/office/drawing/2014/main" id="{DE86D9BA-4DB7-DB17-3F04-03B28C575BAF}"/>
-              </a:ext>
-            </a:extLst>
-          </p:cNvPr>
-          <p:cNvSpPr/>
-          <p:nvPr/>
-        </p:nvSpPr>
-        <p:spPr>
-          <a:xfrm>
-            <a:off x="4344268" y="903412"/>
-            <a:ext cx="2437310" cy="720080"/>
-          </a:xfrm>
-          <a:prstGeom prst="roundRect">
-            <a:avLst/>
-          </a:prstGeom>
-        </p:spPr>
-        <p:style>
-          <a:lnRef idx="2">
-            <a:schemeClr val="accent1">
-              <a:shade val="50000"/>
-            </a:schemeClr>
-          </a:lnRef>
-          <a:fillRef idx="1">
-            <a:schemeClr val="accent1"/>
-          </a:fillRef>
-          <a:effectRef idx="0">
-            <a:schemeClr val="accent1"/>
-          </a:effectRef>
-          <a:fontRef idx="minor">
-            <a:schemeClr val="lt1"/>
-          </a:fontRef>
-        </p:style>
-        <p:txBody>
-          <a:bodyPr rtlCol="0" anchor="ctr"/>
-          <a:lstStyle/>
-          <a:p>
-            <a:pPr algn="ctr"/>
-            <a:r>
-              <a:rPr lang="en-US" dirty="0"/>
-              <a:t>GPU : 6144 Core</a:t>
-            </a:r>
-            <a:endParaRPr lang="en-CA" dirty="0"/>
-          </a:p>
-        </p:txBody>
-      </p:sp>
-      <p:sp>
-        <p:nvSpPr>
-          <p:cNvPr id="10" name="Arrow: Up-Down 9">
-            <a:extLst>
-              <a:ext uri="{FF2B5EF4-FFF2-40B4-BE49-F238E27FC236}">
-                <a16:creationId xmlns:a16="http://schemas.microsoft.com/office/drawing/2014/main" id="{62DA1621-8500-691F-600A-8B14480EAA75}"/>
-              </a:ext>
-            </a:extLst>
-          </p:cNvPr>
-          <p:cNvSpPr/>
-          <p:nvPr/>
-        </p:nvSpPr>
-        <p:spPr>
-          <a:xfrm>
-            <a:off x="5292080" y="1638536"/>
-            <a:ext cx="648072" cy="720080"/>
-          </a:xfrm>
-          <a:prstGeom prst="upDownArrow">
-            <a:avLst>
-              <a:gd name="adj1" fmla="val 50000"/>
-              <a:gd name="adj2" fmla="val 26484"/>
-            </a:avLst>
-          </a:prstGeom>
-        </p:spPr>
-        <p:style>
-          <a:lnRef idx="2">
-            <a:schemeClr val="accent1">
-              <a:shade val="50000"/>
-            </a:schemeClr>
-          </a:lnRef>
-          <a:fillRef idx="1">
-            <a:schemeClr val="accent1"/>
-          </a:fillRef>
-          <a:effectRef idx="0">
-            <a:schemeClr val="accent1"/>
-          </a:effectRef>
-          <a:fontRef idx="minor">
-            <a:schemeClr val="lt1"/>
-          </a:fontRef>
-        </p:style>
-        <p:txBody>
-          <a:bodyPr rtlCol="0" anchor="ctr"/>
-          <a:lstStyle/>
-          <a:p>
-            <a:pPr algn="ctr"/>
-            <a:r>
-              <a:rPr lang="en-US" sz="1050" dirty="0"/>
-              <a:t>Code</a:t>
-            </a:r>
-            <a:endParaRPr lang="en-CA" dirty="0"/>
-          </a:p>
-        </p:txBody>
-      </p:sp>
-      <p:sp>
-        <p:nvSpPr>
-          <p:cNvPr id="13" name="Rectangle: Rounded Corners 12">
-            <a:extLst>
-              <a:ext uri="{FF2B5EF4-FFF2-40B4-BE49-F238E27FC236}">
-                <a16:creationId xmlns:a16="http://schemas.microsoft.com/office/drawing/2014/main" id="{6435AFC8-6E94-B69B-F8FE-CAF13DC60998}"/>
-              </a:ext>
-            </a:extLst>
-          </p:cNvPr>
-          <p:cNvSpPr/>
-          <p:nvPr/>
-        </p:nvSpPr>
-        <p:spPr>
-          <a:xfrm>
-            <a:off x="6732240" y="918456"/>
-            <a:ext cx="1440160" cy="390128"/>
-          </a:xfrm>
-          <a:prstGeom prst="roundRect">
-            <a:avLst/>
-          </a:prstGeom>
-        </p:spPr>
-        <p:style>
-          <a:lnRef idx="2">
-            <a:schemeClr val="accent1">
-              <a:shade val="50000"/>
-            </a:schemeClr>
-          </a:lnRef>
-          <a:fillRef idx="1">
-            <a:schemeClr val="accent1"/>
-          </a:fillRef>
-          <a:effectRef idx="0">
-            <a:schemeClr val="accent1"/>
-          </a:effectRef>
-          <a:fontRef idx="minor">
-            <a:schemeClr val="lt1"/>
-          </a:fontRef>
-        </p:style>
-        <p:txBody>
-          <a:bodyPr rtlCol="0" anchor="ctr"/>
-          <a:lstStyle/>
-          <a:p>
-            <a:pPr algn="ctr"/>
-            <a:r>
-              <a:rPr lang="en-US" sz="1400" dirty="0"/>
-              <a:t>65,000 REG</a:t>
-            </a:r>
-            <a:endParaRPr lang="en-CA" sz="1400" dirty="0"/>
-          </a:p>
-        </p:txBody>
-      </p:sp>
-      <p:sp>
-        <p:nvSpPr>
-          <p:cNvPr id="14" name="Arrow: Up-Down 13">
-            <a:extLst>
-              <a:ext uri="{FF2B5EF4-FFF2-40B4-BE49-F238E27FC236}">
-                <a16:creationId xmlns:a16="http://schemas.microsoft.com/office/drawing/2014/main" id="{F87A5F6B-CAC9-0BCD-1C94-B828CC0D18F7}"/>
-              </a:ext>
-            </a:extLst>
-          </p:cNvPr>
-          <p:cNvSpPr/>
-          <p:nvPr/>
-        </p:nvSpPr>
-        <p:spPr>
-          <a:xfrm rot="16200000">
-            <a:off x="3227860" y="1533712"/>
+            <a:off x="3903005" y="1497708"/>
             <a:ext cx="648072" cy="2280268"/>
           </a:xfrm>
           <a:prstGeom prst="upDownArrow">
@@ -31350,7 +30754,7 @@
 </p:sld>
 </file>
 
-<file path=ppt/slides/slide45.xml><?xml version="1.0" encoding="utf-8"?>
+<file path=ppt/slides/slide44.xml><?xml version="1.0" encoding="utf-8"?>
 <p:sld xmlns:a="http://schemas.openxmlformats.org/drawingml/2006/main" xmlns:r="http://schemas.openxmlformats.org/officeDocument/2006/relationships" xmlns:p="http://schemas.openxmlformats.org/presentationml/2006/main">
   <p:cSld>
     <p:spTree>
@@ -31529,7 +30933,7 @@
 </p:sld>
 </file>
 
-<file path=ppt/slides/slide46.xml><?xml version="1.0" encoding="utf-8"?>
+<file path=ppt/slides/slide45.xml><?xml version="1.0" encoding="utf-8"?>
 <p:sld xmlns:a="http://schemas.openxmlformats.org/drawingml/2006/main" xmlns:r="http://schemas.openxmlformats.org/officeDocument/2006/relationships" xmlns:p="http://schemas.openxmlformats.org/presentationml/2006/main">
   <p:cSld>
     <p:spTree>
@@ -31644,7 +31048,7 @@
 </p:sld>
 </file>
 
-<file path=ppt/slides/slide47.xml><?xml version="1.0" encoding="utf-8"?>
+<file path=ppt/slides/slide46.xml><?xml version="1.0" encoding="utf-8"?>
 <p:sld xmlns:a="http://schemas.openxmlformats.org/drawingml/2006/main" xmlns:r="http://schemas.openxmlformats.org/officeDocument/2006/relationships" xmlns:p="http://schemas.openxmlformats.org/presentationml/2006/main">
   <p:cSld>
     <p:spTree>
@@ -31916,7 +31320,7 @@
 </p:sld>
 </file>
 
-<file path=ppt/slides/slide48.xml><?xml version="1.0" encoding="utf-8"?>
+<file path=ppt/slides/slide47.xml><?xml version="1.0" encoding="utf-8"?>
 <p:sld xmlns:a="http://schemas.openxmlformats.org/drawingml/2006/main" xmlns:r="http://schemas.openxmlformats.org/officeDocument/2006/relationships" xmlns:p="http://schemas.openxmlformats.org/presentationml/2006/main">
   <p:cSld>
     <p:spTree>
@@ -32041,7 +31445,7 @@
 </p:sld>
 </file>
 
-<file path=ppt/slides/slide49.xml><?xml version="1.0" encoding="utf-8"?>
+<file path=ppt/slides/slide48.xml><?xml version="1.0" encoding="utf-8"?>
 <p:sld xmlns:a="http://schemas.openxmlformats.org/drawingml/2006/main" xmlns:r="http://schemas.openxmlformats.org/officeDocument/2006/relationships" xmlns:p="http://schemas.openxmlformats.org/presentationml/2006/main">
   <p:cSld>
     <p:spTree>

</xml_diff>